<commit_message>
Update World Happiness Scores.pptx
</commit_message>
<xml_diff>
--- a/Sam/World Happiness Scores.pptx
+++ b/Sam/World Happiness Scores.pptx
@@ -11,6 +11,7 @@
     <p:sldId id="259" r:id="rId5"/>
     <p:sldId id="260" r:id="rId6"/>
     <p:sldId id="261" r:id="rId7"/>
+    <p:sldId id="262" r:id="rId8"/>
   </p:sldIdLst>
   <p:sldSz cx="12192000" cy="6858000"/>
   <p:notesSz cx="6858000" cy="9144000"/>
@@ -109,6 +110,11 @@
       </a:defRPr>
     </a:lvl9pPr>
   </p:defaultTextStyle>
+  <p:extLst>
+    <p:ext uri="{EFAFB233-063F-42B5-8137-9DF3F51BA10A}">
+      <p15:sldGuideLst xmlns:p15="http://schemas.microsoft.com/office/powerpoint/2012/main"/>
+    </p:ext>
+  </p:extLst>
 </p:presentation>
 </file>
 
@@ -259,7 +265,7 @@
           <a:p>
             <a:fld id="{2D1D7AD4-7B8B-4A46-A2A9-444ACC9454F6}" type="datetimeFigureOut">
               <a:rPr lang="en-US" smtClean="0"/>
-              <a:t>5/5/2022</a:t>
+              <a:t>5/10/2022</a:t>
             </a:fld>
             <a:endParaRPr lang="en-US"/>
           </a:p>
@@ -457,7 +463,7 @@
           <a:p>
             <a:fld id="{2D1D7AD4-7B8B-4A46-A2A9-444ACC9454F6}" type="datetimeFigureOut">
               <a:rPr lang="en-US" smtClean="0"/>
-              <a:t>5/5/2022</a:t>
+              <a:t>5/10/2022</a:t>
             </a:fld>
             <a:endParaRPr lang="en-US"/>
           </a:p>
@@ -665,7 +671,7 @@
           <a:p>
             <a:fld id="{2D1D7AD4-7B8B-4A46-A2A9-444ACC9454F6}" type="datetimeFigureOut">
               <a:rPr lang="en-US" smtClean="0"/>
-              <a:t>5/5/2022</a:t>
+              <a:t>5/10/2022</a:t>
             </a:fld>
             <a:endParaRPr lang="en-US"/>
           </a:p>
@@ -863,7 +869,7 @@
           <a:p>
             <a:fld id="{2D1D7AD4-7B8B-4A46-A2A9-444ACC9454F6}" type="datetimeFigureOut">
               <a:rPr lang="en-US" smtClean="0"/>
-              <a:t>5/5/2022</a:t>
+              <a:t>5/10/2022</a:t>
             </a:fld>
             <a:endParaRPr lang="en-US"/>
           </a:p>
@@ -1138,7 +1144,7 @@
           <a:p>
             <a:fld id="{2D1D7AD4-7B8B-4A46-A2A9-444ACC9454F6}" type="datetimeFigureOut">
               <a:rPr lang="en-US" smtClean="0"/>
-              <a:t>5/5/2022</a:t>
+              <a:t>5/10/2022</a:t>
             </a:fld>
             <a:endParaRPr lang="en-US"/>
           </a:p>
@@ -1403,7 +1409,7 @@
           <a:p>
             <a:fld id="{2D1D7AD4-7B8B-4A46-A2A9-444ACC9454F6}" type="datetimeFigureOut">
               <a:rPr lang="en-US" smtClean="0"/>
-              <a:t>5/5/2022</a:t>
+              <a:t>5/10/2022</a:t>
             </a:fld>
             <a:endParaRPr lang="en-US"/>
           </a:p>
@@ -1815,7 +1821,7 @@
           <a:p>
             <a:fld id="{2D1D7AD4-7B8B-4A46-A2A9-444ACC9454F6}" type="datetimeFigureOut">
               <a:rPr lang="en-US" smtClean="0"/>
-              <a:t>5/5/2022</a:t>
+              <a:t>5/10/2022</a:t>
             </a:fld>
             <a:endParaRPr lang="en-US"/>
           </a:p>
@@ -1956,7 +1962,7 @@
           <a:p>
             <a:fld id="{2D1D7AD4-7B8B-4A46-A2A9-444ACC9454F6}" type="datetimeFigureOut">
               <a:rPr lang="en-US" smtClean="0"/>
-              <a:t>5/5/2022</a:t>
+              <a:t>5/10/2022</a:t>
             </a:fld>
             <a:endParaRPr lang="en-US"/>
           </a:p>
@@ -2069,7 +2075,7 @@
           <a:p>
             <a:fld id="{2D1D7AD4-7B8B-4A46-A2A9-444ACC9454F6}" type="datetimeFigureOut">
               <a:rPr lang="en-US" smtClean="0"/>
-              <a:t>5/5/2022</a:t>
+              <a:t>5/10/2022</a:t>
             </a:fld>
             <a:endParaRPr lang="en-US"/>
           </a:p>
@@ -2380,7 +2386,7 @@
           <a:p>
             <a:fld id="{2D1D7AD4-7B8B-4A46-A2A9-444ACC9454F6}" type="datetimeFigureOut">
               <a:rPr lang="en-US" smtClean="0"/>
-              <a:t>5/5/2022</a:t>
+              <a:t>5/10/2022</a:t>
             </a:fld>
             <a:endParaRPr lang="en-US"/>
           </a:p>
@@ -2668,7 +2674,7 @@
           <a:p>
             <a:fld id="{2D1D7AD4-7B8B-4A46-A2A9-444ACC9454F6}" type="datetimeFigureOut">
               <a:rPr lang="en-US" smtClean="0"/>
-              <a:t>5/5/2022</a:t>
+              <a:t>5/10/2022</a:t>
             </a:fld>
             <a:endParaRPr lang="en-US"/>
           </a:p>
@@ -2926,7 +2932,7 @@
           <a:p>
             <a:fld id="{2D1D7AD4-7B8B-4A46-A2A9-444ACC9454F6}" type="datetimeFigureOut">
               <a:rPr lang="en-US" smtClean="0"/>
-              <a:t>5/5/2022</a:t>
+              <a:t>5/10/2022</a:t>
             </a:fld>
             <a:endParaRPr lang="en-US"/>
           </a:p>
@@ -6182,8 +6188,13 @@
           <a:p>
             <a:r>
               <a:rPr lang="en-US" dirty="0"/>
-              <a:t>To test the data’s resulting function for yielding an accurate result, a sample value may be used.</a:t>
-            </a:r>
+              <a:t>To test the data’s resulting function for yielding an accurate result, a sample value may be used. Regression Model </a:t>
+            </a:r>
+            <a:r>
+              <a:rPr lang="en-US"/>
+              <a:t>is significant. </a:t>
+            </a:r>
+            <a:endParaRPr lang="en-US" dirty="0"/>
           </a:p>
           <a:p>
             <a:r>
@@ -6334,6 +6345,89 @@
     <p:extLst>
       <p:ext uri="{BB962C8B-B14F-4D97-AF65-F5344CB8AC3E}">
         <p14:creationId xmlns:p14="http://schemas.microsoft.com/office/powerpoint/2010/main" val="923246041"/>
+      </p:ext>
+    </p:extLst>
+  </p:cSld>
+  <p:clrMapOvr>
+    <a:masterClrMapping/>
+  </p:clrMapOvr>
+</p:sld>
+</file>
+
+<file path=ppt/slides/slide7.xml><?xml version="1.0" encoding="utf-8"?>
+<p:sld xmlns:a="http://schemas.openxmlformats.org/drawingml/2006/main" xmlns:r="http://schemas.openxmlformats.org/officeDocument/2006/relationships" xmlns:p="http://schemas.openxmlformats.org/presentationml/2006/main">
+  <p:cSld>
+    <p:spTree>
+      <p:nvGrpSpPr>
+        <p:cNvPr id="1" name=""/>
+        <p:cNvGrpSpPr/>
+        <p:nvPr/>
+      </p:nvGrpSpPr>
+      <p:grpSpPr>
+        <a:xfrm>
+          <a:off x="0" y="0"/>
+          <a:ext cx="0" cy="0"/>
+          <a:chOff x="0" y="0"/>
+          <a:chExt cx="0" cy="0"/>
+        </a:xfrm>
+      </p:grpSpPr>
+      <p:sp>
+        <p:nvSpPr>
+          <p:cNvPr id="2" name="Title 1">
+            <a:extLst>
+              <a:ext uri="{FF2B5EF4-FFF2-40B4-BE49-F238E27FC236}">
+                <a16:creationId xmlns:a16="http://schemas.microsoft.com/office/drawing/2014/main" id="{58885904-312F-0679-DB3D-84F04EA1CD7E}"/>
+              </a:ext>
+            </a:extLst>
+          </p:cNvPr>
+          <p:cNvSpPr>
+            <a:spLocks noGrp="1"/>
+          </p:cNvSpPr>
+          <p:nvPr>
+            <p:ph type="title"/>
+          </p:nvPr>
+        </p:nvSpPr>
+        <p:spPr/>
+        <p:txBody>
+          <a:bodyPr/>
+          <a:lstStyle/>
+          <a:p>
+            <a:r>
+              <a:rPr lang="en-US" dirty="0"/>
+              <a:t>Sources </a:t>
+            </a:r>
+          </a:p>
+        </p:txBody>
+      </p:sp>
+      <p:sp>
+        <p:nvSpPr>
+          <p:cNvPr id="3" name="Content Placeholder 2">
+            <a:extLst>
+              <a:ext uri="{FF2B5EF4-FFF2-40B4-BE49-F238E27FC236}">
+                <a16:creationId xmlns:a16="http://schemas.microsoft.com/office/drawing/2014/main" id="{60100502-4C2B-8FF1-4930-CBFF6094FD37}"/>
+              </a:ext>
+            </a:extLst>
+          </p:cNvPr>
+          <p:cNvSpPr>
+            <a:spLocks noGrp="1"/>
+          </p:cNvSpPr>
+          <p:nvPr>
+            <p:ph idx="1"/>
+          </p:nvPr>
+        </p:nvSpPr>
+        <p:spPr/>
+        <p:txBody>
+          <a:bodyPr/>
+          <a:lstStyle/>
+          <a:p>
+            <a:endParaRPr lang="en-US" dirty="0"/>
+          </a:p>
+        </p:txBody>
+      </p:sp>
+    </p:spTree>
+    <p:extLst>
+      <p:ext uri="{BB962C8B-B14F-4D97-AF65-F5344CB8AC3E}">
+        <p14:creationId xmlns:p14="http://schemas.microsoft.com/office/powerpoint/2010/main" val="1344102709"/>
       </p:ext>
     </p:extLst>
   </p:cSld>

</xml_diff>